<commit_message>
functionality of title and stanza OK
</commit_message>
<xml_diff>
--- a/test-presentation.pptx
+++ b/test-presentation.pptx
@@ -6,7 +6,7 @@
   </p:sldMasterIdLst>
   <p:sldIdLst>
     <p:sldId id="256" r:id="rId7"/>
-    <p:sldId id="257" r:id="rId9"/>
+    <p:sldId id="257" r:id="rId8"/>
   </p:sldIdLst>
   <p:sldSz cx="9144000" cy="6858000" type="screen4x3"/>
   <p:notesSz cx="6858000" cy="9144000"/>
@@ -106,422 +106,6 @@
     </a:lvl9pPr>
   </p:defaultTextStyle>
 </p:presentation>
-</file>
-
-<file path=ppt/notesMasters/notesMaster1.xml><?xml version="1.0" encoding="utf-8"?>
-<p:notesMaster xmlns:a="http://schemas.openxmlformats.org/drawingml/2006/main" xmlns:p="http://schemas.openxmlformats.org/presentationml/2006/main" xmlns:r="http://schemas.openxmlformats.org/officeDocument/2006/relationships">
-  <p:cSld>
-    <p:bg>
-      <p:bgRef idx="1001">
-        <a:schemeClr val="bg1"/>
-      </p:bgRef>
-    </p:bg>
-    <p:spTree>
-      <p:nvGrpSpPr>
-        <p:cNvPr id="1" name=""/>
-        <p:cNvGrpSpPr/>
-        <p:nvPr/>
-      </p:nvGrpSpPr>
-      <p:grpSpPr>
-        <a:xfrm>
-          <a:off x="0" y="0"/>
-          <a:ext cx="0" cy="0"/>
-          <a:chOff x="0" y="0"/>
-          <a:chExt cx="0" cy="0"/>
-        </a:xfrm>
-      </p:grpSpPr>
-      <p:sp>
-        <p:nvSpPr>
-          <p:cNvPr id="2" name="Header Placeholder 1"/>
-          <p:cNvSpPr>
-            <a:spLocks noGrp="1"/>
-          </p:cNvSpPr>
-          <p:nvPr>
-            <p:ph type="hdr" sz="quarter"/>
-          </p:nvPr>
-        </p:nvSpPr>
-        <p:spPr>
-          <a:xfrm>
-            <a:off x="0" y="0"/>
-            <a:ext cx="2971800" cy="457200"/>
-          </a:xfrm>
-          <a:prstGeom prst="rect">
-            <a:avLst/>
-          </a:prstGeom>
-        </p:spPr>
-        <p:txBody>
-          <a:bodyPr vert="horz" lIns="91440" tIns="45720" rIns="91440" bIns="45720" rtlCol="0"/>
-          <a:lstStyle>
-            <a:lvl1pPr algn="l">
-              <a:defRPr sz="1200"/>
-            </a:lvl1pPr>
-          </a:lstStyle>
-          <a:p>
-            <a:endParaRPr lang="en-US"/>
-          </a:p>
-        </p:txBody>
-      </p:sp>
-      <p:sp>
-        <p:nvSpPr>
-          <p:cNvPr id="3" name="Date Placeholder 2"/>
-          <p:cNvSpPr>
-            <a:spLocks noGrp="1"/>
-          </p:cNvSpPr>
-          <p:nvPr>
-            <p:ph type="dt" idx="1"/>
-          </p:nvPr>
-        </p:nvSpPr>
-        <p:spPr>
-          <a:xfrm>
-            <a:off x="3884613" y="0"/>
-            <a:ext cx="2971800" cy="457200"/>
-          </a:xfrm>
-          <a:prstGeom prst="rect">
-            <a:avLst/>
-          </a:prstGeom>
-        </p:spPr>
-        <p:txBody>
-          <a:bodyPr vert="horz" lIns="91440" tIns="45720" rIns="91440" bIns="45720" rtlCol="0"/>
-          <a:lstStyle>
-            <a:lvl1pPr algn="r">
-              <a:defRPr sz="1200"/>
-            </a:lvl1pPr>
-          </a:lstStyle>
-          <a:p>
-            <a:fld id="{0F89C1C7-3DCD-1040-A9CF-14679D8B5DDD}" type="datetimeFigureOut">
-              <a:rPr lang="en-US" smtClean="0"/>
-              <a:t>10/17/16</a:t>
-            </a:fld>
-            <a:endParaRPr lang="en-US"/>
-          </a:p>
-        </p:txBody>
-      </p:sp>
-      <p:sp>
-        <p:nvSpPr>
-          <p:cNvPr id="4" name="Slide Image Placeholder 3"/>
-          <p:cNvSpPr>
-            <a:spLocks noGrp="1" noRot="1" noChangeAspect="1"/>
-          </p:cNvSpPr>
-          <p:nvPr>
-            <p:ph type="sldImg" idx="2"/>
-          </p:nvPr>
-        </p:nvSpPr>
-        <p:spPr>
-          <a:xfrm>
-            <a:off x="1143000" y="685800"/>
-            <a:ext cx="4572000" cy="3429000"/>
-          </a:xfrm>
-          <a:prstGeom prst="rect">
-            <a:avLst/>
-          </a:prstGeom>
-          <a:noFill/>
-          <a:ln w="12700">
-            <a:solidFill>
-              <a:prstClr val="black"/>
-            </a:solidFill>
-          </a:ln>
-        </p:spPr>
-        <p:txBody>
-          <a:bodyPr vert="horz" lIns="91440" tIns="45720" rIns="91440" bIns="45720" rtlCol="0" anchor="ctr"/>
-          <a:lstStyle/>
-          <a:p>
-            <a:endParaRPr lang="en-US"/>
-          </a:p>
-        </p:txBody>
-      </p:sp>
-      <p:sp>
-        <p:nvSpPr>
-          <p:cNvPr id="5" name="Notes Placeholder 4"/>
-          <p:cNvSpPr>
-            <a:spLocks noGrp="1"/>
-          </p:cNvSpPr>
-          <p:nvPr>
-            <p:ph type="body" sz="quarter" idx="3"/>
-          </p:nvPr>
-        </p:nvSpPr>
-        <p:spPr>
-          <a:xfrm>
-            <a:off x="685800" y="4343400"/>
-            <a:ext cx="5486400" cy="4114800"/>
-          </a:xfrm>
-          <a:prstGeom prst="rect">
-            <a:avLst/>
-          </a:prstGeom>
-        </p:spPr>
-        <p:txBody>
-          <a:bodyPr vert="horz" lIns="91440" tIns="45720" rIns="91440" bIns="45720" rtlCol="0"/>
-          <a:lstStyle/>
-          <a:p>
-            <a:pPr lvl="0"/>
-            <a:r>
-              <a:rPr lang="en-US" smtClean="0"/>
-              <a:t>Click to edit Master text styles</a:t>
-            </a:r>
-          </a:p>
-          <a:p>
-            <a:pPr lvl="1"/>
-            <a:r>
-              <a:rPr lang="en-US" smtClean="0"/>
-              <a:t>Second level</a:t>
-            </a:r>
-          </a:p>
-          <a:p>
-            <a:pPr lvl="2"/>
-            <a:r>
-              <a:rPr lang="en-US" smtClean="0"/>
-              <a:t>Third level</a:t>
-            </a:r>
-          </a:p>
-          <a:p>
-            <a:pPr lvl="3"/>
-            <a:r>
-              <a:rPr lang="en-US" smtClean="0"/>
-              <a:t>Fourth level</a:t>
-            </a:r>
-          </a:p>
-          <a:p>
-            <a:pPr lvl="4"/>
-            <a:r>
-              <a:rPr lang="en-US" smtClean="0"/>
-              <a:t>Fifth level</a:t>
-            </a:r>
-            <a:endParaRPr lang="en-US"/>
-          </a:p>
-        </p:txBody>
-      </p:sp>
-      <p:sp>
-        <p:nvSpPr>
-          <p:cNvPr id="6" name="Footer Placeholder 5"/>
-          <p:cNvSpPr>
-            <a:spLocks noGrp="1"/>
-          </p:cNvSpPr>
-          <p:nvPr>
-            <p:ph type="ftr" sz="quarter" idx="4"/>
-          </p:nvPr>
-        </p:nvSpPr>
-        <p:spPr>
-          <a:xfrm>
-            <a:off x="0" y="8685213"/>
-            <a:ext cx="2971800" cy="457200"/>
-          </a:xfrm>
-          <a:prstGeom prst="rect">
-            <a:avLst/>
-          </a:prstGeom>
-        </p:spPr>
-        <p:txBody>
-          <a:bodyPr vert="horz" lIns="91440" tIns="45720" rIns="91440" bIns="45720" rtlCol="0" anchor="b"/>
-          <a:lstStyle>
-            <a:lvl1pPr algn="l">
-              <a:defRPr sz="1200"/>
-            </a:lvl1pPr>
-          </a:lstStyle>
-          <a:p>
-            <a:endParaRPr lang="en-US"/>
-          </a:p>
-        </p:txBody>
-      </p:sp>
-      <p:sp>
-        <p:nvSpPr>
-          <p:cNvPr id="7" name="Slide Number Placeholder 6"/>
-          <p:cNvSpPr>
-            <a:spLocks noGrp="1"/>
-          </p:cNvSpPr>
-          <p:nvPr>
-            <p:ph type="sldNum" sz="quarter" idx="5"/>
-          </p:nvPr>
-        </p:nvSpPr>
-        <p:spPr>
-          <a:xfrm>
-            <a:off x="3884613" y="8685213"/>
-            <a:ext cx="2971800" cy="457200"/>
-          </a:xfrm>
-          <a:prstGeom prst="rect">
-            <a:avLst/>
-          </a:prstGeom>
-        </p:spPr>
-        <p:txBody>
-          <a:bodyPr vert="horz" lIns="91440" tIns="45720" rIns="91440" bIns="45720" rtlCol="0" anchor="b"/>
-          <a:lstStyle>
-            <a:lvl1pPr algn="r">
-              <a:defRPr sz="1200"/>
-            </a:lvl1pPr>
-          </a:lstStyle>
-          <a:p>
-            <a:fld id="{BB5E49A5-4136-284D-997B-48E1D791AD67}" type="slidenum">
-              <a:rPr lang="en-US" smtClean="0"/>
-              <a:t>‹#›</a:t>
-            </a:fld>
-            <a:endParaRPr lang="en-US"/>
-          </a:p>
-        </p:txBody>
-      </p:sp>
-    </p:spTree>
-    <p:extLst>
-      <p:ext uri="{BB962C8B-B14F-4D97-AF65-F5344CB8AC3E}">
-        <p14:creationId xmlns:p14="http://schemas.microsoft.com/office/powerpoint/2010/main" val="2623252185"/>
-      </p:ext>
-    </p:extLst>
-  </p:cSld>
-  <p:clrMap bg1="lt1" tx1="dk1" bg2="lt2" tx2="dk2" accent1="accent1" accent2="accent2" accent3="accent3" accent4="accent4" accent5="accent5" accent6="accent6" hlink="hlink" folHlink="folHlink"/>
-  <p:notesStyle>
-    <a:lvl1pPr marL="0" algn="l" defTabSz="457200" rtl="0" eaLnBrk="1" latinLnBrk="0" hangingPunct="1">
-      <a:defRPr sz="1200" kern="1200">
-        <a:solidFill>
-          <a:schemeClr val="tx1"/>
-        </a:solidFill>
-        <a:latin typeface="+mn-lt"/>
-        <a:ea typeface="+mn-ea"/>
-        <a:cs typeface="+mn-cs"/>
-      </a:defRPr>
-    </a:lvl1pPr>
-    <a:lvl2pPr marL="457200" algn="l" defTabSz="457200" rtl="0" eaLnBrk="1" latinLnBrk="0" hangingPunct="1">
-      <a:defRPr sz="1200" kern="1200">
-        <a:solidFill>
-          <a:schemeClr val="tx1"/>
-        </a:solidFill>
-        <a:latin typeface="+mn-lt"/>
-        <a:ea typeface="+mn-ea"/>
-        <a:cs typeface="+mn-cs"/>
-      </a:defRPr>
-    </a:lvl2pPr>
-    <a:lvl3pPr marL="914400" algn="l" defTabSz="457200" rtl="0" eaLnBrk="1" latinLnBrk="0" hangingPunct="1">
-      <a:defRPr sz="1200" kern="1200">
-        <a:solidFill>
-          <a:schemeClr val="tx1"/>
-        </a:solidFill>
-        <a:latin typeface="+mn-lt"/>
-        <a:ea typeface="+mn-ea"/>
-        <a:cs typeface="+mn-cs"/>
-      </a:defRPr>
-    </a:lvl3pPr>
-    <a:lvl4pPr marL="1371600" algn="l" defTabSz="457200" rtl="0" eaLnBrk="1" latinLnBrk="0" hangingPunct="1">
-      <a:defRPr sz="1200" kern="1200">
-        <a:solidFill>
-          <a:schemeClr val="tx1"/>
-        </a:solidFill>
-        <a:latin typeface="+mn-lt"/>
-        <a:ea typeface="+mn-ea"/>
-        <a:cs typeface="+mn-cs"/>
-      </a:defRPr>
-    </a:lvl4pPr>
-    <a:lvl5pPr marL="1828800" algn="l" defTabSz="457200" rtl="0" eaLnBrk="1" latinLnBrk="0" hangingPunct="1">
-      <a:defRPr sz="1200" kern="1200">
-        <a:solidFill>
-          <a:schemeClr val="tx1"/>
-        </a:solidFill>
-        <a:latin typeface="+mn-lt"/>
-        <a:ea typeface="+mn-ea"/>
-        <a:cs typeface="+mn-cs"/>
-      </a:defRPr>
-    </a:lvl5pPr>
-    <a:lvl6pPr marL="2286000" algn="l" defTabSz="457200" rtl="0" eaLnBrk="1" latinLnBrk="0" hangingPunct="1">
-      <a:defRPr sz="1200" kern="1200">
-        <a:solidFill>
-          <a:schemeClr val="tx1"/>
-        </a:solidFill>
-        <a:latin typeface="+mn-lt"/>
-        <a:ea typeface="+mn-ea"/>
-        <a:cs typeface="+mn-cs"/>
-      </a:defRPr>
-    </a:lvl6pPr>
-    <a:lvl7pPr marL="2743200" algn="l" defTabSz="457200" rtl="0" eaLnBrk="1" latinLnBrk="0" hangingPunct="1">
-      <a:defRPr sz="1200" kern="1200">
-        <a:solidFill>
-          <a:schemeClr val="tx1"/>
-        </a:solidFill>
-        <a:latin typeface="+mn-lt"/>
-        <a:ea typeface="+mn-ea"/>
-        <a:cs typeface="+mn-cs"/>
-      </a:defRPr>
-    </a:lvl7pPr>
-    <a:lvl8pPr marL="3200400" algn="l" defTabSz="457200" rtl="0" eaLnBrk="1" latinLnBrk="0" hangingPunct="1">
-      <a:defRPr sz="1200" kern="1200">
-        <a:solidFill>
-          <a:schemeClr val="tx1"/>
-        </a:solidFill>
-        <a:latin typeface="+mn-lt"/>
-        <a:ea typeface="+mn-ea"/>
-        <a:cs typeface="+mn-cs"/>
-      </a:defRPr>
-    </a:lvl8pPr>
-    <a:lvl9pPr marL="3657600" algn="l" defTabSz="457200" rtl="0" eaLnBrk="1" latinLnBrk="0" hangingPunct="1">
-      <a:defRPr sz="1200" kern="1200">
-        <a:solidFill>
-          <a:schemeClr val="tx1"/>
-        </a:solidFill>
-        <a:latin typeface="+mn-lt"/>
-        <a:ea typeface="+mn-ea"/>
-        <a:cs typeface="+mn-cs"/>
-      </a:defRPr>
-    </a:lvl9pPr>
-  </p:notesStyle>
-</p:notesMaster>
-</file>
-
-<file path=ppt/notesSlides/notesSlide1.xml><?xml version="1.0" encoding="utf-8"?>
-<p:notes xmlns:a="http://schemas.openxmlformats.org/drawingml/2006/main" xmlns:p="http://schemas.openxmlformats.org/presentationml/2006/main" xmlns:r="http://schemas.openxmlformats.org/officeDocument/2006/relationships">
-  <p:cSld>
-    <p:spTree>
-      <p:nvGrpSpPr>
-        <p:cNvPr id="1" name=""/>
-        <p:cNvGrpSpPr/>
-        <p:nvPr/>
-      </p:nvGrpSpPr>
-      <p:grpSpPr>
-        <a:xfrm>
-          <a:off x="0" y="0"/>
-          <a:ext cx="0" cy="0"/>
-          <a:chOff x="0" y="0"/>
-          <a:chExt cx="0" cy="0"/>
-        </a:xfrm>
-      </p:grpSpPr>
-      <p:sp>
-        <p:nvSpPr>
-          <p:cNvPr id="2" name="Slide Image Placeholder 1"/>
-          <p:cNvSpPr>
-            <a:spLocks noGrp="1"/>
-          </p:cNvSpPr>
-          <p:nvPr>
-            <p:ph type="sldImg" idx="2"/>
-          </p:nvPr>
-        </p:nvSpPr>
-        <p:spPr/>
-      </p:sp>
-      <p:sp>
-        <p:nvSpPr>
-          <p:cNvPr id="3" name="Notes Placeholder 2"/>
-          <p:cNvSpPr>
-            <a:spLocks noGrp="1"/>
-          </p:cNvSpPr>
-          <p:nvPr>
-            <p:ph type="body" idx="3" sz="quarter"/>
-          </p:nvPr>
-        </p:nvSpPr>
-        <p:spPr/>
-        <p:txBody>
-          <a:bodyPr/>
-          <a:lstStyle/>
-          <a:p/>
-        </p:txBody>
-      </p:sp>
-      <p:sp>
-        <p:nvSpPr>
-          <p:cNvPr id="4" name="Slide Number Placeholder 3"/>
-          <p:cNvSpPr>
-            <a:spLocks noGrp="1"/>
-          </p:cNvSpPr>
-          <p:nvPr>
-            <p:ph type="sldNum" idx="5" sz="quarter"/>
-          </p:nvPr>
-        </p:nvSpPr>
-        <p:spPr/>
-      </p:sp>
-    </p:spTree>
-  </p:cSld>
-  <p:clrMapOvr>
-    <a:masterClrMapping/>
-  </p:clrMapOvr>
-</p:notes>
 </file>
 
 <file path=ppt/slideLayouts/slideLayout1.xml><?xml version="1.0" encoding="utf-8"?>
@@ -3504,12 +3088,7 @@
         <p:cNvGrpSpPr/>
         <p:nvPr/>
       </p:nvGrpSpPr>
-      <p:grpSpPr>
-        <a:xfrm>
-          <a:chOff/>
-          <a:chExt/>
-        </a:xfrm>
-      </p:grpSpPr>
+      <p:grpSpPr/>
       <p:sp>
         <p:nvSpPr>
           <p:cNvPr id="2" name="Title 1"/>
@@ -3522,11 +3101,16 @@
         </p:nvSpPr>
         <p:spPr/>
         <p:txBody>
-          <a:bodyPr/>
-          <a:lstStyle/>
-          <a:p>
-            <a:r>
-              <a:t>Slide 1</a:t>
+          <a:bodyPr>
+            <a:normAutofit/>
+          </a:bodyPr>
+          <a:lstStyle/>
+          <a:p>
+            <a:pPr algn="ctr">
+              <a:defRPr sz="4000" b="1"/>
+            </a:pPr>
+            <a:r>
+              <a:t>DIGNO É O SENHOR</a:t>
             </a:r>
           </a:p>
         </p:txBody>
@@ -3539,8 +3123,8 @@
         </p:nvSpPr>
         <p:spPr>
           <a:xfrm>
-            <a:off x="914400" y="1828800"/>
-            <a:ext cx="2743200" cy="3657600"/>
+            <a:off x="432000" y="2088000"/>
+            <a:ext cx="8280000" cy="4320000"/>
           </a:xfrm>
           <a:prstGeom prst="rect">
             <a:avLst/>
@@ -3549,27 +3133,47 @@
         </p:spPr>
         <p:txBody>
           <a:bodyPr wrap="none">
-            <a:spAutoFit/>
+            <a:normAutofit/>
           </a:bodyPr>
           <a:lstStyle/>
           <a:p>
-            <a:r>
-              <a:t>açslkfajjlkçkljçlkjçjklçlkçsdklf</a:t>
-            </a:r>
-          </a:p>
-          <a:p>
-            <a:r>
-              <a:t>açlkfjaçlsdkfj</a:t>
-            </a:r>
-          </a:p>
-          <a:p>
-            <a:r>
-              <a:t>açlkjfçaskld</a:t>
-            </a:r>
-          </a:p>
-          <a:p>
-            <a:r>
-              <a:t>açlskfdj</a:t>
+            <a:pPr algn="ctr">
+              <a:defRPr sz="3000"/>
+            </a:pPr>
+            <a:r>
+              <a:t>Graças eu te dou, Pai</a:t>
+            </a:r>
+          </a:p>
+          <a:p>
+            <a:pPr algn="ctr">
+              <a:defRPr sz="3000"/>
+            </a:pPr>
+            <a:r>
+              <a:t>Pelo preço que pagou</a:t>
+            </a:r>
+          </a:p>
+          <a:p>
+            <a:pPr algn="ctr">
+              <a:defRPr sz="3000"/>
+            </a:pPr>
+            <a:r>
+              <a:t>Sacrifício de amor</a:t>
+            </a:r>
+          </a:p>
+          <a:p>
+            <a:pPr algn="ctr">
+              <a:defRPr sz="3000"/>
+            </a:pPr>
+            <a:r>
+              <a:t>Que me comprou</a:t>
+            </a:r>
+          </a:p>
+          <a:p>
+            <a:pPr algn="ctr">
+              <a:defRPr sz="3000"/>
+            </a:pPr>
+            <a:r>
+              <a:t>Ungido do Senhor</a:t>
             </a:r>
           </a:p>
         </p:txBody>
@@ -3604,11 +3208,71 @@
         </p:nvSpPr>
         <p:spPr/>
         <p:txBody>
-          <a:bodyPr/>
-          <a:lstStyle/>
-          <a:p>
-            <a:r>
-              <a:t>Slide 2</a:t>
+          <a:bodyPr>
+            <a:normAutofit/>
+          </a:bodyPr>
+          <a:lstStyle/>
+          <a:p>
+            <a:pPr algn="ctr">
+              <a:defRPr sz="4000" b="1"/>
+            </a:pPr>
+            <a:r>
+              <a:t>DIGNO É O SENHOR</a:t>
+            </a:r>
+          </a:p>
+        </p:txBody>
+      </p:sp>
+      <p:sp>
+        <p:nvSpPr>
+          <p:cNvPr id="3" name="TextBox 2"/>
+          <p:cNvSpPr txBox="1"/>
+          <p:nvPr/>
+        </p:nvSpPr>
+        <p:spPr>
+          <a:xfrm>
+            <a:off x="432000" y="2088000"/>
+            <a:ext cx="8280000" cy="4320000"/>
+          </a:xfrm>
+          <a:prstGeom prst="rect">
+            <a:avLst/>
+          </a:prstGeom>
+          <a:noFill/>
+        </p:spPr>
+        <p:txBody>
+          <a:bodyPr wrap="none">
+            <a:normAutofit/>
+          </a:bodyPr>
+          <a:lstStyle/>
+          <a:p>
+            <a:pPr algn="ctr">
+              <a:defRPr sz="3000"/>
+            </a:pPr>
+            <a:r>
+              <a:t>Pelos cravos em Suas mãos</a:t>
+            </a:r>
+          </a:p>
+          <a:p>
+            <a:pPr algn="ctr">
+              <a:defRPr sz="3000"/>
+            </a:pPr>
+            <a:r>
+              <a:t>Graças eu te dou, ó meu Senhor</a:t>
+            </a:r>
+          </a:p>
+          <a:p>
+            <a:pPr algn="ctr">
+              <a:defRPr sz="3000"/>
+            </a:pPr>
+            <a:r>
+              <a:t>Lavou minha mente e coração</a:t>
+            </a:r>
+          </a:p>
+          <a:p>
+            <a:pPr algn="ctr">
+              <a:defRPr sz="3000"/>
+            </a:pPr>
+            <a:r>
+              <a:t>Me deu perdão</a:t>
             </a:r>
           </a:p>
         </p:txBody>
@@ -3939,324 +3603,4 @@
   </a:objectDefaults>
   <a:extraClrSchemeLst/>
 </a:theme>
-</file>
-
-<file path=ppt/theme/theme2.xml><?xml version="1.0" encoding="utf-8"?>
-<a:theme xmlns:a="http://schemas.openxmlformats.org/drawingml/2006/main" name="Office Theme">
-  <a:themeElements>
-    <a:clrScheme name="Office">
-      <a:dk1>
-        <a:sysClr val="windowText" lastClr="000000"/>
-      </a:dk1>
-      <a:lt1>
-        <a:sysClr val="window" lastClr="FFFFFF"/>
-      </a:lt1>
-      <a:dk2>
-        <a:srgbClr val="1F497D"/>
-      </a:dk2>
-      <a:lt2>
-        <a:srgbClr val="EEECE1"/>
-      </a:lt2>
-      <a:accent1>
-        <a:srgbClr val="4F81BD"/>
-      </a:accent1>
-      <a:accent2>
-        <a:srgbClr val="C0504D"/>
-      </a:accent2>
-      <a:accent3>
-        <a:srgbClr val="9BBB59"/>
-      </a:accent3>
-      <a:accent4>
-        <a:srgbClr val="8064A2"/>
-      </a:accent4>
-      <a:accent5>
-        <a:srgbClr val="4BACC6"/>
-      </a:accent5>
-      <a:accent6>
-        <a:srgbClr val="F79646"/>
-      </a:accent6>
-      <a:hlink>
-        <a:srgbClr val="0000FF"/>
-      </a:hlink>
-      <a:folHlink>
-        <a:srgbClr val="800080"/>
-      </a:folHlink>
-    </a:clrScheme>
-    <a:fontScheme name="Office">
-      <a:majorFont>
-        <a:latin typeface="Calibri"/>
-        <a:ea typeface=""/>
-        <a:cs typeface=""/>
-        <a:font script="Jpan" typeface="ＭＳ Ｐゴシック"/>
-        <a:font script="Hang" typeface="맑은 고딕"/>
-        <a:font script="Hans" typeface="宋体"/>
-        <a:font script="Hant" typeface="新細明體"/>
-        <a:font script="Arab" typeface="Times New Roman"/>
-        <a:font script="Hebr" typeface="Times New Roman"/>
-        <a:font script="Thai" typeface="Angsana New"/>
-        <a:font script="Ethi" typeface="Nyala"/>
-        <a:font script="Beng" typeface="Vrinda"/>
-        <a:font script="Gujr" typeface="Shruti"/>
-        <a:font script="Khmr" typeface="MoolBoran"/>
-        <a:font script="Knda" typeface="Tunga"/>
-        <a:font script="Guru" typeface="Raavi"/>
-        <a:font script="Cans" typeface="Euphemia"/>
-        <a:font script="Cher" typeface="Plantagenet Cherokee"/>
-        <a:font script="Yiii" typeface="Microsoft Yi Baiti"/>
-        <a:font script="Tibt" typeface="Microsoft Himalaya"/>
-        <a:font script="Thaa" typeface="MV Boli"/>
-        <a:font script="Deva" typeface="Mangal"/>
-        <a:font script="Telu" typeface="Gautami"/>
-        <a:font script="Taml" typeface="Latha"/>
-        <a:font script="Syrc" typeface="Estrangelo Edessa"/>
-        <a:font script="Orya" typeface="Kalinga"/>
-        <a:font script="Mlym" typeface="Kartika"/>
-        <a:font script="Laoo" typeface="DokChampa"/>
-        <a:font script="Sinh" typeface="Iskoola Pota"/>
-        <a:font script="Mong" typeface="Mongolian Baiti"/>
-        <a:font script="Viet" typeface="Times New Roman"/>
-        <a:font script="Uigh" typeface="Microsoft Uighur"/>
-        <a:font script="Geor" typeface="Sylfaen"/>
-      </a:majorFont>
-      <a:minorFont>
-        <a:latin typeface="Calibri"/>
-        <a:ea typeface=""/>
-        <a:cs typeface=""/>
-        <a:font script="Jpan" typeface="ＭＳ Ｐゴシック"/>
-        <a:font script="Hang" typeface="맑은 고딕"/>
-        <a:font script="Hans" typeface="宋体"/>
-        <a:font script="Hant" typeface="新細明體"/>
-        <a:font script="Arab" typeface="Arial"/>
-        <a:font script="Hebr" typeface="Arial"/>
-        <a:font script="Thai" typeface="Cordia New"/>
-        <a:font script="Ethi" typeface="Nyala"/>
-        <a:font script="Beng" typeface="Vrinda"/>
-        <a:font script="Gujr" typeface="Shruti"/>
-        <a:font script="Khmr" typeface="DaunPenh"/>
-        <a:font script="Knda" typeface="Tunga"/>
-        <a:font script="Guru" typeface="Raavi"/>
-        <a:font script="Cans" typeface="Euphemia"/>
-        <a:font script="Cher" typeface="Plantagenet Cherokee"/>
-        <a:font script="Yiii" typeface="Microsoft Yi Baiti"/>
-        <a:font script="Tibt" typeface="Microsoft Himalaya"/>
-        <a:font script="Thaa" typeface="MV Boli"/>
-        <a:font script="Deva" typeface="Mangal"/>
-        <a:font script="Telu" typeface="Gautami"/>
-        <a:font script="Taml" typeface="Latha"/>
-        <a:font script="Syrc" typeface="Estrangelo Edessa"/>
-        <a:font script="Orya" typeface="Kalinga"/>
-        <a:font script="Mlym" typeface="Kartika"/>
-        <a:font script="Laoo" typeface="DokChampa"/>
-        <a:font script="Sinh" typeface="Iskoola Pota"/>
-        <a:font script="Mong" typeface="Mongolian Baiti"/>
-        <a:font script="Viet" typeface="Arial"/>
-        <a:font script="Uigh" typeface="Microsoft Uighur"/>
-        <a:font script="Geor" typeface="Sylfaen"/>
-      </a:minorFont>
-    </a:fontScheme>
-    <a:fmtScheme name="Office">
-      <a:fillStyleLst>
-        <a:solidFill>
-          <a:schemeClr val="phClr"/>
-        </a:solidFill>
-        <a:gradFill rotWithShape="1">
-          <a:gsLst>
-            <a:gs pos="0">
-              <a:schemeClr val="phClr">
-                <a:tint val="50000"/>
-                <a:satMod val="300000"/>
-              </a:schemeClr>
-            </a:gs>
-            <a:gs pos="35000">
-              <a:schemeClr val="phClr">
-                <a:tint val="37000"/>
-                <a:satMod val="300000"/>
-              </a:schemeClr>
-            </a:gs>
-            <a:gs pos="100000">
-              <a:schemeClr val="phClr">
-                <a:tint val="15000"/>
-                <a:satMod val="350000"/>
-              </a:schemeClr>
-            </a:gs>
-          </a:gsLst>
-          <a:lin ang="16200000" scaled="1"/>
-        </a:gradFill>
-        <a:gradFill rotWithShape="1">
-          <a:gsLst>
-            <a:gs pos="0">
-              <a:schemeClr val="phClr">
-                <a:tint val="100000"/>
-                <a:shade val="100000"/>
-                <a:satMod val="130000"/>
-              </a:schemeClr>
-            </a:gs>
-            <a:gs pos="100000">
-              <a:schemeClr val="phClr">
-                <a:tint val="50000"/>
-                <a:shade val="100000"/>
-                <a:satMod val="350000"/>
-              </a:schemeClr>
-            </a:gs>
-          </a:gsLst>
-          <a:lin ang="16200000" scaled="0"/>
-        </a:gradFill>
-      </a:fillStyleLst>
-      <a:lnStyleLst>
-        <a:ln w="9525" cap="flat" cmpd="sng" algn="ctr">
-          <a:solidFill>
-            <a:schemeClr val="phClr">
-              <a:shade val="95000"/>
-              <a:satMod val="105000"/>
-            </a:schemeClr>
-          </a:solidFill>
-          <a:prstDash val="solid"/>
-        </a:ln>
-        <a:ln w="25400" cap="flat" cmpd="sng" algn="ctr">
-          <a:solidFill>
-            <a:schemeClr val="phClr"/>
-          </a:solidFill>
-          <a:prstDash val="solid"/>
-        </a:ln>
-        <a:ln w="38100" cap="flat" cmpd="sng" algn="ctr">
-          <a:solidFill>
-            <a:schemeClr val="phClr"/>
-          </a:solidFill>
-          <a:prstDash val="solid"/>
-        </a:ln>
-      </a:lnStyleLst>
-      <a:effectStyleLst>
-        <a:effectStyle>
-          <a:effectLst>
-            <a:outerShdw blurRad="40000" dist="20000" dir="5400000" rotWithShape="0">
-              <a:srgbClr val="000000">
-                <a:alpha val="38000"/>
-              </a:srgbClr>
-            </a:outerShdw>
-          </a:effectLst>
-        </a:effectStyle>
-        <a:effectStyle>
-          <a:effectLst>
-            <a:outerShdw blurRad="40000" dist="23000" dir="5400000" rotWithShape="0">
-              <a:srgbClr val="000000">
-                <a:alpha val="35000"/>
-              </a:srgbClr>
-            </a:outerShdw>
-          </a:effectLst>
-        </a:effectStyle>
-        <a:effectStyle>
-          <a:effectLst>
-            <a:outerShdw blurRad="40000" dist="23000" dir="5400000" rotWithShape="0">
-              <a:srgbClr val="000000">
-                <a:alpha val="35000"/>
-              </a:srgbClr>
-            </a:outerShdw>
-          </a:effectLst>
-          <a:scene3d>
-            <a:camera prst="orthographicFront">
-              <a:rot lat="0" lon="0" rev="0"/>
-            </a:camera>
-            <a:lightRig rig="threePt" dir="t">
-              <a:rot lat="0" lon="0" rev="1200000"/>
-            </a:lightRig>
-          </a:scene3d>
-          <a:sp3d>
-            <a:bevelT w="63500" h="25400"/>
-          </a:sp3d>
-        </a:effectStyle>
-      </a:effectStyleLst>
-      <a:bgFillStyleLst>
-        <a:solidFill>
-          <a:schemeClr val="phClr"/>
-        </a:solidFill>
-        <a:gradFill rotWithShape="1">
-          <a:gsLst>
-            <a:gs pos="0">
-              <a:schemeClr val="phClr">
-                <a:tint val="40000"/>
-                <a:satMod val="350000"/>
-              </a:schemeClr>
-            </a:gs>
-            <a:gs pos="40000">
-              <a:schemeClr val="phClr">
-                <a:tint val="45000"/>
-                <a:shade val="99000"/>
-                <a:satMod val="350000"/>
-              </a:schemeClr>
-            </a:gs>
-            <a:gs pos="100000">
-              <a:schemeClr val="phClr">
-                <a:shade val="20000"/>
-                <a:satMod val="255000"/>
-              </a:schemeClr>
-            </a:gs>
-          </a:gsLst>
-          <a:path path="circle">
-            <a:fillToRect l="50000" t="-80000" r="50000" b="180000"/>
-          </a:path>
-        </a:gradFill>
-        <a:gradFill rotWithShape="1">
-          <a:gsLst>
-            <a:gs pos="0">
-              <a:schemeClr val="phClr">
-                <a:tint val="80000"/>
-                <a:satMod val="300000"/>
-              </a:schemeClr>
-            </a:gs>
-            <a:gs pos="100000">
-              <a:schemeClr val="phClr">
-                <a:shade val="30000"/>
-                <a:satMod val="200000"/>
-              </a:schemeClr>
-            </a:gs>
-          </a:gsLst>
-          <a:path path="circle">
-            <a:fillToRect l="50000" t="50000" r="50000" b="50000"/>
-          </a:path>
-        </a:gradFill>
-      </a:bgFillStyleLst>
-    </a:fmtScheme>
-  </a:themeElements>
-  <a:objectDefaults>
-    <a:spDef>
-      <a:spPr/>
-      <a:bodyPr/>
-      <a:lstStyle/>
-      <a:style>
-        <a:lnRef idx="1">
-          <a:schemeClr val="accent1"/>
-        </a:lnRef>
-        <a:fillRef idx="3">
-          <a:schemeClr val="accent1"/>
-        </a:fillRef>
-        <a:effectRef idx="2">
-          <a:schemeClr val="accent1"/>
-        </a:effectRef>
-        <a:fontRef idx="minor">
-          <a:schemeClr val="lt1"/>
-        </a:fontRef>
-      </a:style>
-    </a:spDef>
-    <a:lnDef>
-      <a:spPr/>
-      <a:bodyPr/>
-      <a:lstStyle/>
-      <a:style>
-        <a:lnRef idx="2">
-          <a:schemeClr val="accent1"/>
-        </a:lnRef>
-        <a:fillRef idx="0">
-          <a:schemeClr val="accent1"/>
-        </a:fillRef>
-        <a:effectRef idx="1">
-          <a:schemeClr val="accent1"/>
-        </a:effectRef>
-        <a:fontRef idx="minor">
-          <a:schemeClr val="tx1"/>
-        </a:fontRef>
-      </a:style>
-    </a:lnDef>
-  </a:objectDefaults>
-  <a:extraClrSchemeLst/>
-</a:theme>
 </file>
</xml_diff>

<commit_message>
read from file mechanism and background mechanism OK
</commit_message>
<xml_diff>
--- a/test-presentation.pptx
+++ b/test-presentation.pptx
@@ -7,6 +7,8 @@
   <p:sldIdLst>
     <p:sldId id="256" r:id="rId7"/>
     <p:sldId id="257" r:id="rId8"/>
+    <p:sldId id="258" r:id="rId9"/>
+    <p:sldId id="259" r:id="rId10"/>
   </p:sldIdLst>
   <p:sldSz cx="9144000" cy="6858000" type="screen4x3"/>
   <p:notesSz cx="6858000" cy="9144000"/>
@@ -3089,35 +3091,93 @@
         <p:nvPr/>
       </p:nvGrpSpPr>
       <p:grpSpPr/>
-      <p:sp>
-        <p:nvSpPr>
-          <p:cNvPr id="2" name="Title 1"/>
-          <p:cNvSpPr>
-            <a:spLocks noGrp="1"/>
-          </p:cNvSpPr>
-          <p:nvPr>
-            <p:ph type="title"/>
-          </p:nvPr>
-        </p:nvSpPr>
-        <p:spPr/>
-        <p:txBody>
-          <a:bodyPr>
+      <p:pic>
+        <p:nvPicPr>
+          <p:cNvPr id="2" name="Picture 1" descr="faces.gif"/>
+          <p:cNvPicPr>
+            <a:picLocks noChangeAspect="1"/>
+          </p:cNvPicPr>
+          <p:nvPr/>
+        </p:nvPicPr>
+        <p:blipFill>
+          <a:blip r:embed="rId2"/>
+          <a:stretch>
+            <a:fillRect/>
+          </a:stretch>
+        </p:blipFill>
+        <p:spPr>
+          <a:xfrm>
+            <a:off x="0" y="0"/>
+            <a:ext cx="9144000" cy="6858000"/>
+          </a:xfrm>
+          <a:prstGeom prst="rect">
+            <a:avLst/>
+          </a:prstGeom>
+        </p:spPr>
+      </p:pic>
+      <p:pic>
+        <p:nvPicPr>
+          <p:cNvPr id="3" name="Picture 2" descr="nasa.jpg"/>
+          <p:cNvPicPr>
+            <a:picLocks noChangeAspect="1"/>
+          </p:cNvPicPr>
+          <p:nvPr/>
+        </p:nvPicPr>
+        <p:blipFill>
+          <a:blip r:embed="rId3"/>
+          <a:stretch>
+            <a:fillRect/>
+          </a:stretch>
+        </p:blipFill>
+        <p:spPr>
+          <a:xfrm>
+            <a:off x="7776000" y="5274000"/>
+            <a:ext cx="1368000" cy="1584000"/>
+          </a:xfrm>
+          <a:prstGeom prst="rect">
+            <a:avLst/>
+          </a:prstGeom>
+        </p:spPr>
+      </p:pic>
+      <p:sp>
+        <p:nvSpPr>
+          <p:cNvPr id="4" name="TextBox 3"/>
+          <p:cNvSpPr txBox="1"/>
+          <p:nvPr/>
+        </p:nvSpPr>
+        <p:spPr>
+          <a:xfrm>
+            <a:off x="468000" y="288000"/>
+            <a:ext cx="8243999" cy="1152000"/>
+          </a:xfrm>
+          <a:prstGeom prst="rect">
+            <a:avLst/>
+          </a:prstGeom>
+          <a:noFill/>
+        </p:spPr>
+        <p:txBody>
+          <a:bodyPr wrap="none">
             <a:normAutofit/>
           </a:bodyPr>
           <a:lstStyle/>
           <a:p>
             <a:pPr algn="ctr">
-              <a:defRPr sz="4000" b="1"/>
+              <a:defRPr sz="4000" b="1">
+                <a:solidFill>
+                  <a:srgbClr val="FFFFFF"/>
+                </a:solidFill>
+              </a:defRPr>
             </a:pPr>
             <a:r>
-              <a:t>DIGNO É O SENHOR</a:t>
-            </a:r>
-          </a:p>
-        </p:txBody>
-      </p:sp>
-      <p:sp>
-        <p:nvSpPr>
-          <p:cNvPr id="3" name="TextBox 2"/>
+              <a:t>DIGNO É O SENHOR (WORTHY IS THE LAMB)</a:t>
+            </a:r>
+          </a:p>
+          <a:p/>
+        </p:txBody>
+      </p:sp>
+      <p:sp>
+        <p:nvSpPr>
+          <p:cNvPr id="5" name="TextBox 4"/>
           <p:cNvSpPr txBox="1"/>
           <p:nvPr/>
         </p:nvSpPr>
@@ -3138,43 +3198,72 @@
           <a:lstStyle/>
           <a:p>
             <a:pPr algn="ctr">
-              <a:defRPr sz="3000"/>
+              <a:defRPr sz="3000">
+                <a:solidFill>
+                  <a:srgbClr val="FFFFFF"/>
+                </a:solidFill>
+              </a:defRPr>
             </a:pPr>
             <a:r>
-              <a:t>Graças eu te dou, Pai</a:t>
+              <a:t>GRAÇAS EU TE DOU, PAI</a:t>
             </a:r>
           </a:p>
           <a:p>
             <a:pPr algn="ctr">
-              <a:defRPr sz="3000"/>
+              <a:defRPr sz="3000">
+                <a:solidFill>
+                  <a:srgbClr val="FFFFFF"/>
+                </a:solidFill>
+              </a:defRPr>
             </a:pPr>
             <a:r>
-              <a:t>Pelo preço que pagou</a:t>
+              <a:t>PELO PREÇO QUE PAGOU</a:t>
             </a:r>
           </a:p>
           <a:p>
             <a:pPr algn="ctr">
-              <a:defRPr sz="3000"/>
+              <a:defRPr sz="3000">
+                <a:solidFill>
+                  <a:srgbClr val="FFFFFF"/>
+                </a:solidFill>
+              </a:defRPr>
             </a:pPr>
             <a:r>
-              <a:t>Sacrifício de amor</a:t>
+              <a:t>SACRIFÍCIO DE AMOR</a:t>
             </a:r>
           </a:p>
           <a:p>
             <a:pPr algn="ctr">
-              <a:defRPr sz="3000"/>
+              <a:defRPr sz="3000">
+                <a:solidFill>
+                  <a:srgbClr val="FFFFFF"/>
+                </a:solidFill>
+              </a:defRPr>
             </a:pPr>
             <a:r>
-              <a:t>Que me comprou</a:t>
+              <a:t>QUE ME COMPROU</a:t>
             </a:r>
           </a:p>
           <a:p>
             <a:pPr algn="ctr">
-              <a:defRPr sz="3000"/>
+              <a:defRPr sz="3000">
+                <a:solidFill>
+                  <a:srgbClr val="FFFFFF"/>
+                </a:solidFill>
+              </a:defRPr>
             </a:pPr>
             <a:r>
-              <a:t>Ungido do Senhor</a:t>
-            </a:r>
+              <a:t>UNGIDO DO SENHOR</a:t>
+            </a:r>
+          </a:p>
+          <a:p>
+            <a:pPr algn="ctr">
+              <a:defRPr sz="3000">
+                <a:solidFill>
+                  <a:srgbClr val="FFFFFF"/>
+                </a:solidFill>
+              </a:defRPr>
+            </a:pPr>
           </a:p>
         </p:txBody>
       </p:sp>
@@ -3196,35 +3285,93 @@
         <p:nvPr/>
       </p:nvGrpSpPr>
       <p:grpSpPr/>
-      <p:sp>
-        <p:nvSpPr>
-          <p:cNvPr id="2" name="Title 1"/>
-          <p:cNvSpPr>
-            <a:spLocks noGrp="1"/>
-          </p:cNvSpPr>
-          <p:nvPr>
-            <p:ph type="title"/>
-          </p:nvPr>
-        </p:nvSpPr>
-        <p:spPr/>
-        <p:txBody>
-          <a:bodyPr>
+      <p:pic>
+        <p:nvPicPr>
+          <p:cNvPr id="2" name="Picture 1" descr="faces.gif"/>
+          <p:cNvPicPr>
+            <a:picLocks noChangeAspect="1"/>
+          </p:cNvPicPr>
+          <p:nvPr/>
+        </p:nvPicPr>
+        <p:blipFill>
+          <a:blip r:embed="rId2"/>
+          <a:stretch>
+            <a:fillRect/>
+          </a:stretch>
+        </p:blipFill>
+        <p:spPr>
+          <a:xfrm>
+            <a:off x="0" y="0"/>
+            <a:ext cx="9144000" cy="6858000"/>
+          </a:xfrm>
+          <a:prstGeom prst="rect">
+            <a:avLst/>
+          </a:prstGeom>
+        </p:spPr>
+      </p:pic>
+      <p:pic>
+        <p:nvPicPr>
+          <p:cNvPr id="3" name="Picture 2" descr="nasa.jpg"/>
+          <p:cNvPicPr>
+            <a:picLocks noChangeAspect="1"/>
+          </p:cNvPicPr>
+          <p:nvPr/>
+        </p:nvPicPr>
+        <p:blipFill>
+          <a:blip r:embed="rId3"/>
+          <a:stretch>
+            <a:fillRect/>
+          </a:stretch>
+        </p:blipFill>
+        <p:spPr>
+          <a:xfrm>
+            <a:off x="7776000" y="5274000"/>
+            <a:ext cx="1368000" cy="1584000"/>
+          </a:xfrm>
+          <a:prstGeom prst="rect">
+            <a:avLst/>
+          </a:prstGeom>
+        </p:spPr>
+      </p:pic>
+      <p:sp>
+        <p:nvSpPr>
+          <p:cNvPr id="4" name="TextBox 3"/>
+          <p:cNvSpPr txBox="1"/>
+          <p:nvPr/>
+        </p:nvSpPr>
+        <p:spPr>
+          <a:xfrm>
+            <a:off x="468000" y="288000"/>
+            <a:ext cx="8243999" cy="1152000"/>
+          </a:xfrm>
+          <a:prstGeom prst="rect">
+            <a:avLst/>
+          </a:prstGeom>
+          <a:noFill/>
+        </p:spPr>
+        <p:txBody>
+          <a:bodyPr wrap="none">
             <a:normAutofit/>
           </a:bodyPr>
           <a:lstStyle/>
           <a:p>
             <a:pPr algn="ctr">
-              <a:defRPr sz="4000" b="1"/>
+              <a:defRPr sz="4000" b="1">
+                <a:solidFill>
+                  <a:srgbClr val="FFFFFF"/>
+                </a:solidFill>
+              </a:defRPr>
             </a:pPr>
             <a:r>
-              <a:t>DIGNO É O SENHOR</a:t>
-            </a:r>
-          </a:p>
-        </p:txBody>
-      </p:sp>
-      <p:sp>
-        <p:nvSpPr>
-          <p:cNvPr id="3" name="TextBox 2"/>
+              <a:t>DIGNO É O SENHOR (WORTHY IS THE LAMB)</a:t>
+            </a:r>
+          </a:p>
+          <a:p/>
+        </p:txBody>
+      </p:sp>
+      <p:sp>
+        <p:nvSpPr>
+          <p:cNvPr id="5" name="TextBox 4"/>
           <p:cNvSpPr txBox="1"/>
           <p:nvPr/>
         </p:nvSpPr>
@@ -3245,35 +3392,448 @@
           <a:lstStyle/>
           <a:p>
             <a:pPr algn="ctr">
-              <a:defRPr sz="3000"/>
+              <a:defRPr sz="3000">
+                <a:solidFill>
+                  <a:srgbClr val="FFFFFF"/>
+                </a:solidFill>
+              </a:defRPr>
             </a:pPr>
             <a:r>
-              <a:t>Pelos cravos em Suas mãos</a:t>
+              <a:t>PELOS CRAVOS EM SUAS MÃOS</a:t>
             </a:r>
           </a:p>
           <a:p>
             <a:pPr algn="ctr">
-              <a:defRPr sz="3000"/>
+              <a:defRPr sz="3000">
+                <a:solidFill>
+                  <a:srgbClr val="FFFFFF"/>
+                </a:solidFill>
+              </a:defRPr>
             </a:pPr>
             <a:r>
-              <a:t>Graças eu te dou, ó meu Senhor</a:t>
+              <a:t>GRAÇAS EU TE DOU, Ó MEU SENHOR</a:t>
             </a:r>
           </a:p>
           <a:p>
             <a:pPr algn="ctr">
-              <a:defRPr sz="3000"/>
+              <a:defRPr sz="3000">
+                <a:solidFill>
+                  <a:srgbClr val="FFFFFF"/>
+                </a:solidFill>
+              </a:defRPr>
             </a:pPr>
             <a:r>
-              <a:t>Lavou minha mente e coração</a:t>
+              <a:t>LAVOU MINHA MENTE E CORAÇÃO</a:t>
             </a:r>
           </a:p>
           <a:p>
             <a:pPr algn="ctr">
-              <a:defRPr sz="3000"/>
+              <a:defRPr sz="3000">
+                <a:solidFill>
+                  <a:srgbClr val="FFFFFF"/>
+                </a:solidFill>
+              </a:defRPr>
             </a:pPr>
             <a:r>
-              <a:t>Me deu perdão</a:t>
-            </a:r>
+              <a:t>ME DEU PERDÃO</a:t>
+            </a:r>
+          </a:p>
+          <a:p>
+            <a:pPr algn="ctr">
+              <a:defRPr sz="3000">
+                <a:solidFill>
+                  <a:srgbClr val="FFFFFF"/>
+                </a:solidFill>
+              </a:defRPr>
+            </a:pPr>
+          </a:p>
+        </p:txBody>
+      </p:sp>
+    </p:spTree>
+  </p:cSld>
+  <p:clrMapOvr>
+    <a:masterClrMapping/>
+  </p:clrMapOvr>
+</p:sld>
+</file>
+
+<file path=ppt/slides/slide3.xml><?xml version="1.0" encoding="utf-8"?>
+<p:sld xmlns:a="http://schemas.openxmlformats.org/drawingml/2006/main" xmlns:p="http://schemas.openxmlformats.org/presentationml/2006/main" xmlns:r="http://schemas.openxmlformats.org/officeDocument/2006/relationships">
+  <p:cSld>
+    <p:spTree>
+      <p:nvGrpSpPr>
+        <p:cNvPr id="1" name=""/>
+        <p:cNvGrpSpPr/>
+        <p:nvPr/>
+      </p:nvGrpSpPr>
+      <p:grpSpPr/>
+      <p:pic>
+        <p:nvPicPr>
+          <p:cNvPr id="2" name="Picture 1" descr="faces.gif"/>
+          <p:cNvPicPr>
+            <a:picLocks noChangeAspect="1"/>
+          </p:cNvPicPr>
+          <p:nvPr/>
+        </p:nvPicPr>
+        <p:blipFill>
+          <a:blip r:embed="rId2"/>
+          <a:stretch>
+            <a:fillRect/>
+          </a:stretch>
+        </p:blipFill>
+        <p:spPr>
+          <a:xfrm>
+            <a:off x="0" y="0"/>
+            <a:ext cx="9144000" cy="6858000"/>
+          </a:xfrm>
+          <a:prstGeom prst="rect">
+            <a:avLst/>
+          </a:prstGeom>
+        </p:spPr>
+      </p:pic>
+      <p:pic>
+        <p:nvPicPr>
+          <p:cNvPr id="3" name="Picture 2" descr="nasa.jpg"/>
+          <p:cNvPicPr>
+            <a:picLocks noChangeAspect="1"/>
+          </p:cNvPicPr>
+          <p:nvPr/>
+        </p:nvPicPr>
+        <p:blipFill>
+          <a:blip r:embed="rId3"/>
+          <a:stretch>
+            <a:fillRect/>
+          </a:stretch>
+        </p:blipFill>
+        <p:spPr>
+          <a:xfrm>
+            <a:off x="7776000" y="5274000"/>
+            <a:ext cx="1368000" cy="1584000"/>
+          </a:xfrm>
+          <a:prstGeom prst="rect">
+            <a:avLst/>
+          </a:prstGeom>
+        </p:spPr>
+      </p:pic>
+      <p:sp>
+        <p:nvSpPr>
+          <p:cNvPr id="4" name="TextBox 3"/>
+          <p:cNvSpPr txBox="1"/>
+          <p:nvPr/>
+        </p:nvSpPr>
+        <p:spPr>
+          <a:xfrm>
+            <a:off x="468000" y="288000"/>
+            <a:ext cx="8243999" cy="1152000"/>
+          </a:xfrm>
+          <a:prstGeom prst="rect">
+            <a:avLst/>
+          </a:prstGeom>
+          <a:noFill/>
+        </p:spPr>
+        <p:txBody>
+          <a:bodyPr wrap="none">
+            <a:normAutofit/>
+          </a:bodyPr>
+          <a:lstStyle/>
+          <a:p>
+            <a:pPr algn="ctr">
+              <a:defRPr sz="4000" b="1">
+                <a:solidFill>
+                  <a:srgbClr val="FFFFFF"/>
+                </a:solidFill>
+              </a:defRPr>
+            </a:pPr>
+            <a:r>
+              <a:t>DIGNO É O SENHOR (WORTHY IS THE LAMB)</a:t>
+            </a:r>
+          </a:p>
+          <a:p/>
+        </p:txBody>
+      </p:sp>
+      <p:sp>
+        <p:nvSpPr>
+          <p:cNvPr id="5" name="TextBox 4"/>
+          <p:cNvSpPr txBox="1"/>
+          <p:nvPr/>
+        </p:nvSpPr>
+        <p:spPr>
+          <a:xfrm>
+            <a:off x="432000" y="2088000"/>
+            <a:ext cx="8280000" cy="4320000"/>
+          </a:xfrm>
+          <a:prstGeom prst="rect">
+            <a:avLst/>
+          </a:prstGeom>
+          <a:noFill/>
+        </p:spPr>
+        <p:txBody>
+          <a:bodyPr wrap="none">
+            <a:normAutofit/>
+          </a:bodyPr>
+          <a:lstStyle/>
+          <a:p>
+            <a:pPr algn="ctr">
+              <a:defRPr sz="3000">
+                <a:solidFill>
+                  <a:srgbClr val="FFFFFF"/>
+                </a:solidFill>
+              </a:defRPr>
+            </a:pPr>
+            <a:r>
+              <a:t>RESTAUROU-ME A COMUNHÃO</a:t>
+            </a:r>
+          </a:p>
+          <a:p>
+            <a:pPr algn="ctr">
+              <a:defRPr sz="3000">
+                <a:solidFill>
+                  <a:srgbClr val="FFFFFF"/>
+                </a:solidFill>
+              </a:defRPr>
+            </a:pPr>
+          </a:p>
+        </p:txBody>
+      </p:sp>
+    </p:spTree>
+  </p:cSld>
+  <p:clrMapOvr>
+    <a:masterClrMapping/>
+  </p:clrMapOvr>
+</p:sld>
+</file>
+
+<file path=ppt/slides/slide4.xml><?xml version="1.0" encoding="utf-8"?>
+<p:sld xmlns:a="http://schemas.openxmlformats.org/drawingml/2006/main" xmlns:p="http://schemas.openxmlformats.org/presentationml/2006/main" xmlns:r="http://schemas.openxmlformats.org/officeDocument/2006/relationships">
+  <p:cSld>
+    <p:spTree>
+      <p:nvGrpSpPr>
+        <p:cNvPr id="1" name=""/>
+        <p:cNvGrpSpPr/>
+        <p:nvPr/>
+      </p:nvGrpSpPr>
+      <p:grpSpPr/>
+      <p:pic>
+        <p:nvPicPr>
+          <p:cNvPr id="2" name="Picture 1" descr="faces.gif"/>
+          <p:cNvPicPr>
+            <a:picLocks noChangeAspect="1"/>
+          </p:cNvPicPr>
+          <p:nvPr/>
+        </p:nvPicPr>
+        <p:blipFill>
+          <a:blip r:embed="rId2"/>
+          <a:stretch>
+            <a:fillRect/>
+          </a:stretch>
+        </p:blipFill>
+        <p:spPr>
+          <a:xfrm>
+            <a:off x="0" y="0"/>
+            <a:ext cx="9144000" cy="6858000"/>
+          </a:xfrm>
+          <a:prstGeom prst="rect">
+            <a:avLst/>
+          </a:prstGeom>
+        </p:spPr>
+      </p:pic>
+      <p:pic>
+        <p:nvPicPr>
+          <p:cNvPr id="3" name="Picture 2" descr="nasa.jpg"/>
+          <p:cNvPicPr>
+            <a:picLocks noChangeAspect="1"/>
+          </p:cNvPicPr>
+          <p:nvPr/>
+        </p:nvPicPr>
+        <p:blipFill>
+          <a:blip r:embed="rId3"/>
+          <a:stretch>
+            <a:fillRect/>
+          </a:stretch>
+        </p:blipFill>
+        <p:spPr>
+          <a:xfrm>
+            <a:off x="7776000" y="5274000"/>
+            <a:ext cx="1368000" cy="1584000"/>
+          </a:xfrm>
+          <a:prstGeom prst="rect">
+            <a:avLst/>
+          </a:prstGeom>
+        </p:spPr>
+      </p:pic>
+      <p:sp>
+        <p:nvSpPr>
+          <p:cNvPr id="4" name="TextBox 3"/>
+          <p:cNvSpPr txBox="1"/>
+          <p:nvPr/>
+        </p:nvSpPr>
+        <p:spPr>
+          <a:xfrm>
+            <a:off x="468000" y="288000"/>
+            <a:ext cx="8243999" cy="1152000"/>
+          </a:xfrm>
+          <a:prstGeom prst="rect">
+            <a:avLst/>
+          </a:prstGeom>
+          <a:noFill/>
+        </p:spPr>
+        <p:txBody>
+          <a:bodyPr wrap="none">
+            <a:normAutofit/>
+          </a:bodyPr>
+          <a:lstStyle/>
+          <a:p>
+            <a:pPr algn="ctr">
+              <a:defRPr sz="4000" b="1">
+                <a:solidFill>
+                  <a:srgbClr val="FFFFFF"/>
+                </a:solidFill>
+              </a:defRPr>
+            </a:pPr>
+            <a:r>
+              <a:t>DIGNO É O SENHOR (WORTHY IS THE LAMB)</a:t>
+            </a:r>
+          </a:p>
+          <a:p/>
+        </p:txBody>
+      </p:sp>
+      <p:sp>
+        <p:nvSpPr>
+          <p:cNvPr id="5" name="TextBox 4"/>
+          <p:cNvSpPr txBox="1"/>
+          <p:nvPr/>
+        </p:nvSpPr>
+        <p:spPr>
+          <a:xfrm>
+            <a:off x="432000" y="2088000"/>
+            <a:ext cx="8280000" cy="4320000"/>
+          </a:xfrm>
+          <a:prstGeom prst="rect">
+            <a:avLst/>
+          </a:prstGeom>
+          <a:noFill/>
+        </p:spPr>
+        <p:txBody>
+          <a:bodyPr wrap="none">
+            <a:normAutofit/>
+          </a:bodyPr>
+          <a:lstStyle/>
+          <a:p>
+            <a:pPr algn="ctr">
+              <a:defRPr sz="3000">
+                <a:solidFill>
+                  <a:srgbClr val="FFFFFF"/>
+                </a:solidFill>
+              </a:defRPr>
+            </a:pPr>
+            <a:r>
+              <a:t>DIGNO É O SENHOR</a:t>
+            </a:r>
+          </a:p>
+          <a:p>
+            <a:pPr algn="ctr">
+              <a:defRPr sz="3000">
+                <a:solidFill>
+                  <a:srgbClr val="FFFFFF"/>
+                </a:solidFill>
+              </a:defRPr>
+            </a:pPr>
+            <a:r>
+              <a:t>SOBRE O TRONO ESTÁ</a:t>
+            </a:r>
+          </a:p>
+          <a:p>
+            <a:pPr algn="ctr">
+              <a:defRPr sz="3000">
+                <a:solidFill>
+                  <a:srgbClr val="FFFFFF"/>
+                </a:solidFill>
+              </a:defRPr>
+            </a:pPr>
+            <a:r>
+              <a:t>SOBERANO, CRIADOR</a:t>
+            </a:r>
+          </a:p>
+          <a:p>
+            <a:pPr algn="ctr">
+              <a:defRPr sz="3000">
+                <a:solidFill>
+                  <a:srgbClr val="FFFFFF"/>
+                </a:solidFill>
+              </a:defRPr>
+            </a:pPr>
+            <a:r>
+              <a:t>VOU SEMPRE TE ADORAR</a:t>
+            </a:r>
+          </a:p>
+          <a:p>
+            <a:pPr algn="ctr">
+              <a:defRPr sz="3000">
+                <a:solidFill>
+                  <a:srgbClr val="FFFFFF"/>
+                </a:solidFill>
+              </a:defRPr>
+            </a:pPr>
+            <a:r>
+              <a:t>ELEVO MINHAS MÃOS</a:t>
+            </a:r>
+          </a:p>
+          <a:p>
+            <a:pPr algn="ctr">
+              <a:defRPr sz="3000">
+                <a:solidFill>
+                  <a:srgbClr val="FFFFFF"/>
+                </a:solidFill>
+              </a:defRPr>
+            </a:pPr>
+            <a:r>
+              <a:t>AO CRISTO QUE VENCEU</a:t>
+            </a:r>
+          </a:p>
+          <a:p>
+            <a:pPr algn="ctr">
+              <a:defRPr sz="3000">
+                <a:solidFill>
+                  <a:srgbClr val="FFFFFF"/>
+                </a:solidFill>
+              </a:defRPr>
+            </a:pPr>
+            <a:r>
+              <a:t>CORDEIRO DE DEUS MORREU POR MIM</a:t>
+            </a:r>
+          </a:p>
+          <a:p>
+            <a:pPr algn="ctr">
+              <a:defRPr sz="3000">
+                <a:solidFill>
+                  <a:srgbClr val="FFFFFF"/>
+                </a:solidFill>
+              </a:defRPr>
+            </a:pPr>
+            <a:r>
+              <a:t>MAS RESSUSCITOU</a:t>
+            </a:r>
+          </a:p>
+          <a:p>
+            <a:pPr algn="ctr">
+              <a:defRPr sz="3000">
+                <a:solidFill>
+                  <a:srgbClr val="FFFFFF"/>
+                </a:solidFill>
+              </a:defRPr>
+            </a:pPr>
+            <a:r>
+              <a:t>DIGNO É O SENHOR</a:t>
+            </a:r>
+          </a:p>
+          <a:p>
+            <a:pPr algn="ctr">
+              <a:defRPr sz="3000">
+                <a:solidFill>
+                  <a:srgbClr val="FFFFFF"/>
+                </a:solidFill>
+              </a:defRPr>
+            </a:pPr>
           </a:p>
         </p:txBody>
       </p:sp>

</xml_diff>